<commit_message>
slides with partners for peer review
</commit_message>
<xml_diff>
--- a/week_06/slides/rbp_workshop_06.pptx
+++ b/week_06/slides/rbp_workshop_06.pptx
@@ -13,8 +13,8 @@
     <p:sldId id="1789" r:id="rId4"/>
     <p:sldId id="1802" r:id="rId5"/>
     <p:sldId id="1801" r:id="rId6"/>
-    <p:sldId id="1738" r:id="rId7"/>
-    <p:sldId id="1798" r:id="rId8"/>
+    <p:sldId id="1803" r:id="rId7"/>
+    <p:sldId id="1738" r:id="rId8"/>
   </p:sldIdLst>
   <p:sldSz cx="12192000" cy="6858000"/>
   <p:notesSz cx="6858000" cy="9144000"/>
@@ -31530,7 +31530,7 @@
     </p:spTree>
     <p:extLst>
       <p:ext uri="{BB962C8B-B14F-4D97-AF65-F5344CB8AC3E}">
-        <p14:creationId xmlns:p14="http://schemas.microsoft.com/office/powerpoint/2010/main" val="819424315"/>
+        <p14:creationId xmlns:p14="http://schemas.microsoft.com/office/powerpoint/2010/main" val="4088770297"/>
       </p:ext>
     </p:extLst>
   </p:cSld>
@@ -31541,11 +31541,11 @@
 </file>
 
 <file path=ppt/notesSlides/notesSlide7.xml><?xml version="1.0" encoding="utf-8"?>
-<p:notes xmlns:a="http://schemas.openxmlformats.org/drawingml/2006/main" xmlns:r="http://schemas.openxmlformats.org/officeDocument/2006/relationships" xmlns:p="http://schemas.openxmlformats.org/presentationml/2006/main" showMasterSp="0" showMasterPhAnim="0">
+<p:notes xmlns:a="http://schemas.openxmlformats.org/drawingml/2006/main" xmlns:r="http://schemas.openxmlformats.org/officeDocument/2006/relationships" xmlns:p="http://schemas.openxmlformats.org/presentationml/2006/main">
   <p:cSld>
     <p:spTree>
       <p:nvGrpSpPr>
-        <p:cNvPr id="1" name="Shape 45"/>
+        <p:cNvPr id="1" name=""/>
         <p:cNvGrpSpPr/>
         <p:nvPr/>
       </p:nvGrpSpPr>
@@ -31559,12 +31559,12 @@
       </p:grpSpPr>
       <p:sp>
         <p:nvSpPr>
-          <p:cNvPr id="46" name="Google Shape;46;g15964faf8e4_0_0:notes"/>
+          <p:cNvPr id="2" name="Slide Image Placeholder 1"/>
           <p:cNvSpPr>
             <a:spLocks noGrp="1" noRot="1" noChangeAspect="1"/>
           </p:cNvSpPr>
           <p:nvPr>
-            <p:ph type="sldImg" idx="2"/>
+            <p:ph type="sldImg"/>
           </p:nvPr>
         </p:nvSpPr>
         <p:spPr>
@@ -31572,74 +31572,79 @@
             <a:off x="381000" y="685800"/>
             <a:ext cx="6096000" cy="3429000"/>
           </a:xfrm>
-          <a:custGeom>
-            <a:avLst/>
-            <a:gdLst/>
-            <a:ahLst/>
-            <a:cxnLst/>
-            <a:rect l="l" t="t" r="r" b="b"/>
-            <a:pathLst>
-              <a:path w="120000" h="120000" extrusionOk="0">
-                <a:moveTo>
-                  <a:pt x="0" y="0"/>
-                </a:moveTo>
-                <a:lnTo>
-                  <a:pt x="120000" y="0"/>
-                </a:lnTo>
-                <a:lnTo>
-                  <a:pt x="120000" y="120000"/>
-                </a:lnTo>
-                <a:lnTo>
-                  <a:pt x="0" y="120000"/>
-                </a:lnTo>
-                <a:close/>
-              </a:path>
-            </a:pathLst>
-          </a:custGeom>
         </p:spPr>
       </p:sp>
       <p:sp>
         <p:nvSpPr>
-          <p:cNvPr id="47" name="Google Shape;47;g15964faf8e4_0_0:notes"/>
-          <p:cNvSpPr txBox="1">
+          <p:cNvPr id="3" name="Notes Placeholder 2"/>
+          <p:cNvSpPr>
             <a:spLocks noGrp="1"/>
           </p:cNvSpPr>
           <p:nvPr>
             <p:ph type="body" idx="1"/>
           </p:nvPr>
         </p:nvSpPr>
-        <p:spPr>
-          <a:xfrm>
-            <a:off x="685800" y="4343400"/>
-            <a:ext cx="5486400" cy="4114800"/>
-          </a:xfrm>
-          <a:prstGeom prst="rect">
-            <a:avLst/>
-          </a:prstGeom>
-        </p:spPr>
+        <p:spPr/>
         <p:txBody>
-          <a:bodyPr spcFirstLastPara="1" wrap="square" lIns="91425" tIns="91425" rIns="91425" bIns="91425" anchor="t" anchorCtr="0">
-            <a:noAutofit/>
-          </a:bodyPr>
+          <a:bodyPr/>
           <a:lstStyle/>
           <a:p>
-            <a:pPr marL="0" lvl="0" indent="0" algn="l" rtl="0">
+            <a:pPr marL="0" marR="0" lvl="0" indent="0" algn="l" defTabSz="914400" rtl="0" eaLnBrk="1" fontAlgn="auto" latinLnBrk="0" hangingPunct="1">
+              <a:lnSpc>
+                <a:spcPct val="100000"/>
+              </a:lnSpc>
               <a:spcBef>
                 <a:spcPts val="0"/>
               </a:spcBef>
               <a:spcAft>
                 <a:spcPts val="0"/>
               </a:spcAft>
+              <a:buClrTx/>
+              <a:buSzTx/>
+              <a:buFontTx/>
               <a:buNone/>
+              <a:tabLst/>
+              <a:defRPr/>
             </a:pPr>
-            <a:endParaRPr dirty="0"/>
+            <a:endParaRPr lang="en-US" dirty="0">
+              <a:solidFill>
+                <a:srgbClr val="17161C"/>
+              </a:solidFill>
+              <a:latin typeface="Avenir Next" panose="020B0503020202020204" pitchFamily="34" charset="0"/>
+              <a:ea typeface="Nunito"/>
+              <a:cs typeface="Nunito"/>
+              <a:sym typeface="Nunito"/>
+            </a:endParaRPr>
+          </a:p>
+        </p:txBody>
+      </p:sp>
+      <p:sp>
+        <p:nvSpPr>
+          <p:cNvPr id="4" name="Slide Number Placeholder 3"/>
+          <p:cNvSpPr>
+            <a:spLocks noGrp="1"/>
+          </p:cNvSpPr>
+          <p:nvPr>
+            <p:ph type="sldNum" sz="quarter" idx="5"/>
+          </p:nvPr>
+        </p:nvSpPr>
+        <p:spPr/>
+        <p:txBody>
+          <a:bodyPr/>
+          <a:lstStyle/>
+          <a:p>
+            <a:fld id="{1526202F-DEF9-4191-8752-62497FCB2E3D}" type="slidenum">
+              <a:rPr lang="en-US" smtClean="0"/>
+              <a:t>7</a:t>
+            </a:fld>
+            <a:endParaRPr lang="en-US"/>
           </a:p>
         </p:txBody>
       </p:sp>
     </p:spTree>
     <p:extLst>
       <p:ext uri="{BB962C8B-B14F-4D97-AF65-F5344CB8AC3E}">
-        <p14:creationId xmlns:p14="http://schemas.microsoft.com/office/powerpoint/2010/main" val="506552655"/>
+        <p14:creationId xmlns:p14="http://schemas.microsoft.com/office/powerpoint/2010/main" val="819424315"/>
       </p:ext>
     </p:extLst>
   </p:cSld>
@@ -35930,6 +35935,16 @@
               <a:t>Today: </a:t>
             </a:r>
             <a:r>
+              <a:rPr lang="en-CH" sz="2800" dirty="0">
+                <a:solidFill>
+                  <a:schemeClr val="accent2"/>
+                </a:solidFill>
+                <a:latin typeface="Calibri" panose="020F0502020204030204" pitchFamily="34" charset="0"/>
+                <a:cs typeface="Calibri" panose="020F0502020204030204" pitchFamily="34" charset="0"/>
+              </a:rPr>
+              <a:t>clean data, </a:t>
+            </a:r>
+            <a:r>
               <a:rPr lang="en-CH" sz="2800" b="1" dirty="0">
                 <a:solidFill>
                   <a:schemeClr val="accent2"/>
@@ -35937,7 +35952,7 @@
                 <a:latin typeface="Calibri" panose="020F0502020204030204" pitchFamily="34" charset="0"/>
                 <a:cs typeface="Calibri" panose="020F0502020204030204" pitchFamily="34" charset="0"/>
               </a:rPr>
-              <a:t>clean data </a:t>
+              <a:t>create new variables, </a:t>
             </a:r>
             <a:r>
               <a:rPr lang="en-CH" sz="2800" dirty="0">
@@ -35964,14 +35979,14 @@
                 <a:latin typeface="Calibri" panose="020F0502020204030204" pitchFamily="34" charset="0"/>
                 <a:cs typeface="Calibri" panose="020F0502020204030204" pitchFamily="34" charset="0"/>
               </a:rPr>
-              <a:t>Using select(), filter() and </a:t>
+              <a:t>Using select(), filter(), mutate(), </a:t>
             </a:r>
             <a:r>
               <a:rPr lang="en-CH" sz="2800" b="1" dirty="0">
                 <a:latin typeface="Calibri" panose="020F0502020204030204" pitchFamily="34" charset="0"/>
                 <a:cs typeface="Calibri" panose="020F0502020204030204" pitchFamily="34" charset="0"/>
               </a:rPr>
-              <a:t>mutate()</a:t>
+              <a:t>case_when(), group_by(), summarize()</a:t>
             </a:r>
           </a:p>
           <a:p>
@@ -36132,15 +36147,7 @@
                 <a:cs typeface="Calibri" panose="020F0502020204030204" pitchFamily="34" charset="0"/>
                 <a:sym typeface="Wingdings" pitchFamily="2" charset="2"/>
               </a:rPr>
-              <a:t>Today: I will give you your partner for </a:t>
-            </a:r>
-            <a:r>
-              <a:rPr lang="en-CH" sz="2800">
-                <a:latin typeface="Calibri" panose="020F0502020204030204" pitchFamily="34" charset="0"/>
-                <a:cs typeface="Calibri" panose="020F0502020204030204" pitchFamily="34" charset="0"/>
-                <a:sym typeface="Wingdings" pitchFamily="2" charset="2"/>
-              </a:rPr>
-              <a:t>peer review (at the end)</a:t>
+              <a:t>Today: I will give you your partner for peer review (at the end)</a:t>
             </a:r>
             <a:endParaRPr lang="en-CH" sz="2800" dirty="0">
               <a:latin typeface="Calibri" panose="020F0502020204030204" pitchFamily="34" charset="0"/>
@@ -36718,6 +36725,1054 @@
         <p:spPr>
           <a:xfrm>
             <a:off x="355478" y="128981"/>
+            <a:ext cx="6251711" cy="954107"/>
+          </a:xfrm>
+          <a:prstGeom prst="rect">
+            <a:avLst/>
+          </a:prstGeom>
+          <a:noFill/>
+        </p:spPr>
+        <p:txBody>
+          <a:bodyPr wrap="none">
+            <a:spAutoFit/>
+          </a:bodyPr>
+          <a:lstStyle/>
+          <a:p>
+            <a:r>
+              <a:rPr lang="en" sz="2800" kern="0" dirty="0">
+                <a:solidFill>
+                  <a:schemeClr val="tx1"/>
+                </a:solidFill>
+              </a:rPr>
+              <a:t>👋🏽</a:t>
+            </a:r>
+            <a:r>
+              <a:rPr lang="en" sz="2800" dirty="0">
+                <a:solidFill>
+                  <a:schemeClr val="tx1"/>
+                </a:solidFill>
+              </a:rPr>
+              <a:t> </a:t>
+            </a:r>
+            <a:r>
+              <a:rPr lang="en" sz="2800" b="1" dirty="0">
+                <a:solidFill>
+                  <a:schemeClr val="tx1"/>
+                </a:solidFill>
+                <a:latin typeface="Avenir Next" panose="020B0503020202020204" pitchFamily="34" charset="0"/>
+              </a:rPr>
+              <a:t>Send your </a:t>
+            </a:r>
+            <a:r>
+              <a:rPr lang="en" sz="2800" b="1" dirty="0" err="1">
+                <a:solidFill>
+                  <a:schemeClr val="tx1"/>
+                </a:solidFill>
+                <a:latin typeface="Avenir Next" panose="020B0503020202020204" pitchFamily="34" charset="0"/>
+              </a:rPr>
+              <a:t>Rmd</a:t>
+            </a:r>
+            <a:r>
+              <a:rPr lang="en" sz="2800" b="1" dirty="0">
+                <a:solidFill>
+                  <a:schemeClr val="tx1"/>
+                </a:solidFill>
+                <a:latin typeface="Avenir Next" panose="020B0503020202020204" pitchFamily="34" charset="0"/>
+              </a:rPr>
+              <a:t> for Peer Review </a:t>
+            </a:r>
+            <a:endParaRPr lang="en" sz="2800" b="1" kern="0" dirty="0">
+              <a:solidFill>
+                <a:schemeClr val="tx1"/>
+              </a:solidFill>
+              <a:latin typeface="Avenir Next" panose="020B0503020202020204" pitchFamily="34" charset="0"/>
+            </a:endParaRPr>
+          </a:p>
+          <a:p>
+            <a:endParaRPr lang="en-US" sz="2800" b="1" dirty="0">
+              <a:latin typeface="Avenir Next" panose="020B0503020202020204" pitchFamily="34" charset="0"/>
+            </a:endParaRPr>
+          </a:p>
+        </p:txBody>
+      </p:sp>
+      <p:graphicFrame>
+        <p:nvGraphicFramePr>
+          <p:cNvPr id="2" name="Table 2">
+            <a:extLst>
+              <a:ext uri="{FF2B5EF4-FFF2-40B4-BE49-F238E27FC236}">
+                <a16:creationId xmlns:a16="http://schemas.microsoft.com/office/drawing/2014/main" id="{7EB7C072-6EF6-CE41-9637-3C71678F995C}"/>
+              </a:ext>
+            </a:extLst>
+          </p:cNvPr>
+          <p:cNvGraphicFramePr>
+            <a:graphicFrameLocks noGrp="1"/>
+          </p:cNvGraphicFramePr>
+          <p:nvPr>
+            <p:extLst>
+              <p:ext uri="{D42A27DB-BD31-4B8C-83A1-F6EECF244321}">
+                <p14:modId xmlns:p14="http://schemas.microsoft.com/office/powerpoint/2010/main" val="1767007580"/>
+              </p:ext>
+            </p:extLst>
+          </p:nvPr>
+        </p:nvGraphicFramePr>
+        <p:xfrm>
+          <a:off x="695459" y="1571222"/>
+          <a:ext cx="10522040" cy="3206840"/>
+        </p:xfrm>
+        <a:graphic>
+          <a:graphicData uri="http://schemas.openxmlformats.org/drawingml/2006/table">
+            <a:tbl>
+              <a:tblPr firstRow="1" bandRow="1">
+                <a:tableStyleId>{5C22544A-7EE6-4342-B048-85BDC9FD1C3A}</a:tableStyleId>
+              </a:tblPr>
+              <a:tblGrid>
+                <a:gridCol w="1236372">
+                  <a:extLst>
+                    <a:ext uri="{9D8B030D-6E8A-4147-A177-3AD203B41FA5}">
+                      <a16:colId xmlns:a16="http://schemas.microsoft.com/office/drawing/2014/main" val="2229874144"/>
+                    </a:ext>
+                  </a:extLst>
+                </a:gridCol>
+                <a:gridCol w="868036">
+                  <a:extLst>
+                    <a:ext uri="{9D8B030D-6E8A-4147-A177-3AD203B41FA5}">
+                      <a16:colId xmlns:a16="http://schemas.microsoft.com/office/drawing/2014/main" val="1232229936"/>
+                    </a:ext>
+                  </a:extLst>
+                </a:gridCol>
+                <a:gridCol w="1052204">
+                  <a:extLst>
+                    <a:ext uri="{9D8B030D-6E8A-4147-A177-3AD203B41FA5}">
+                      <a16:colId xmlns:a16="http://schemas.microsoft.com/office/drawing/2014/main" val="3881139467"/>
+                    </a:ext>
+                  </a:extLst>
+                </a:gridCol>
+                <a:gridCol w="1286599">
+                  <a:extLst>
+                    <a:ext uri="{9D8B030D-6E8A-4147-A177-3AD203B41FA5}">
+                      <a16:colId xmlns:a16="http://schemas.microsoft.com/office/drawing/2014/main" val="1298830351"/>
+                    </a:ext>
+                  </a:extLst>
+                </a:gridCol>
+                <a:gridCol w="817809">
+                  <a:extLst>
+                    <a:ext uri="{9D8B030D-6E8A-4147-A177-3AD203B41FA5}">
+                      <a16:colId xmlns:a16="http://schemas.microsoft.com/office/drawing/2014/main" val="1708735127"/>
+                    </a:ext>
+                  </a:extLst>
+                </a:gridCol>
+                <a:gridCol w="1052204">
+                  <a:extLst>
+                    <a:ext uri="{9D8B030D-6E8A-4147-A177-3AD203B41FA5}">
+                      <a16:colId xmlns:a16="http://schemas.microsoft.com/office/drawing/2014/main" val="3004700367"/>
+                    </a:ext>
+                  </a:extLst>
+                </a:gridCol>
+                <a:gridCol w="1362585">
+                  <a:extLst>
+                    <a:ext uri="{9D8B030D-6E8A-4147-A177-3AD203B41FA5}">
+                      <a16:colId xmlns:a16="http://schemas.microsoft.com/office/drawing/2014/main" val="1831894250"/>
+                    </a:ext>
+                  </a:extLst>
+                </a:gridCol>
+                <a:gridCol w="978794">
+                  <a:extLst>
+                    <a:ext uri="{9D8B030D-6E8A-4147-A177-3AD203B41FA5}">
+                      <a16:colId xmlns:a16="http://schemas.microsoft.com/office/drawing/2014/main" val="2936384821"/>
+                    </a:ext>
+                  </a:extLst>
+                </a:gridCol>
+                <a:gridCol w="901521">
+                  <a:extLst>
+                    <a:ext uri="{9D8B030D-6E8A-4147-A177-3AD203B41FA5}">
+                      <a16:colId xmlns:a16="http://schemas.microsoft.com/office/drawing/2014/main" val="3488508873"/>
+                    </a:ext>
+                  </a:extLst>
+                </a:gridCol>
+                <a:gridCol w="965916">
+                  <a:extLst>
+                    <a:ext uri="{9D8B030D-6E8A-4147-A177-3AD203B41FA5}">
+                      <a16:colId xmlns:a16="http://schemas.microsoft.com/office/drawing/2014/main" val="3772318894"/>
+                    </a:ext>
+                  </a:extLst>
+                </a:gridCol>
+              </a:tblGrid>
+              <a:tr h="1603420">
+                <a:tc>
+                  <a:txBody>
+                    <a:bodyPr/>
+                    <a:lstStyle/>
+                    <a:p>
+                      <a:pPr algn="ctr"/>
+                      <a:r>
+                        <a:rPr lang="en-CH" dirty="0"/>
+                        <a:t>Blanche</a:t>
+                      </a:r>
+                    </a:p>
+                  </a:txBody>
+                  <a:tcPr anchor="ctr"/>
+                </a:tc>
+                <a:tc>
+                  <a:txBody>
+                    <a:bodyPr/>
+                    <a:lstStyle/>
+                    <a:p>
+                      <a:pPr algn="ctr"/>
+                      <a:r>
+                        <a:rPr lang="en-CH" dirty="0"/>
+                        <a:t>Alice</a:t>
+                      </a:r>
+                    </a:p>
+                  </a:txBody>
+                  <a:tcPr anchor="ctr"/>
+                </a:tc>
+                <a:tc>
+                  <a:txBody>
+                    <a:bodyPr/>
+                    <a:lstStyle/>
+                    <a:p>
+                      <a:pPr algn="ctr"/>
+                      <a:r>
+                        <a:rPr lang="en-CH" dirty="0"/>
+                        <a:t>Ojay</a:t>
+                      </a:r>
+                    </a:p>
+                  </a:txBody>
+                  <a:tcPr anchor="ctr"/>
+                </a:tc>
+                <a:tc>
+                  <a:txBody>
+                    <a:bodyPr/>
+                    <a:lstStyle/>
+                    <a:p>
+                      <a:pPr algn="ctr"/>
+                      <a:r>
+                        <a:rPr lang="en-CH" dirty="0"/>
+                        <a:t>Cusi</a:t>
+                      </a:r>
+                    </a:p>
+                  </a:txBody>
+                  <a:tcPr anchor="ctr"/>
+                </a:tc>
+                <a:tc>
+                  <a:txBody>
+                    <a:bodyPr/>
+                    <a:lstStyle/>
+                    <a:p>
+                      <a:pPr algn="ctr"/>
+                      <a:r>
+                        <a:rPr lang="en-CH" dirty="0"/>
+                        <a:t>Alice</a:t>
+                      </a:r>
+                    </a:p>
+                  </a:txBody>
+                  <a:tcPr anchor="ctr"/>
+                </a:tc>
+                <a:tc>
+                  <a:txBody>
+                    <a:bodyPr/>
+                    <a:lstStyle/>
+                    <a:p>
+                      <a:pPr algn="ctr"/>
+                      <a:r>
+                        <a:rPr lang="en-CH" dirty="0"/>
+                        <a:t>Trokon</a:t>
+                      </a:r>
+                    </a:p>
+                  </a:txBody>
+                  <a:tcPr anchor="ctr"/>
+                </a:tc>
+                <a:tc>
+                  <a:txBody>
+                    <a:bodyPr/>
+                    <a:lstStyle/>
+                    <a:p>
+                      <a:pPr algn="ctr"/>
+                      <a:r>
+                        <a:rPr lang="en-CH" dirty="0"/>
+                        <a:t>Chrisotpher</a:t>
+                      </a:r>
+                    </a:p>
+                  </a:txBody>
+                  <a:tcPr anchor="ctr"/>
+                </a:tc>
+                <a:tc>
+                  <a:txBody>
+                    <a:bodyPr/>
+                    <a:lstStyle/>
+                    <a:p>
+                      <a:pPr algn="ctr"/>
+                      <a:r>
+                        <a:rPr lang="en-CH" dirty="0"/>
+                        <a:t>Eric</a:t>
+                      </a:r>
+                    </a:p>
+                  </a:txBody>
+                  <a:tcPr anchor="ctr"/>
+                </a:tc>
+                <a:tc>
+                  <a:txBody>
+                    <a:bodyPr/>
+                    <a:lstStyle/>
+                    <a:p>
+                      <a:pPr algn="ctr"/>
+                      <a:r>
+                        <a:rPr lang="en-CH" dirty="0"/>
+                        <a:t>Sophie</a:t>
+                      </a:r>
+                    </a:p>
+                  </a:txBody>
+                  <a:tcPr anchor="ctr"/>
+                </a:tc>
+                <a:tc>
+                  <a:txBody>
+                    <a:bodyPr/>
+                    <a:lstStyle/>
+                    <a:p>
+                      <a:pPr algn="ctr"/>
+                      <a:r>
+                        <a:rPr lang="en-CH" dirty="0"/>
+                        <a:t>Hubert</a:t>
+                      </a:r>
+                    </a:p>
+                  </a:txBody>
+                  <a:tcPr anchor="ctr"/>
+                </a:tc>
+                <a:extLst>
+                  <a:ext uri="{0D108BD9-81ED-4DB2-BD59-A6C34878D82A}">
+                    <a16:rowId xmlns:a16="http://schemas.microsoft.com/office/drawing/2014/main" val="778200936"/>
+                  </a:ext>
+                </a:extLst>
+              </a:tr>
+              <a:tr h="1603420">
+                <a:tc>
+                  <a:txBody>
+                    <a:bodyPr/>
+                    <a:lstStyle/>
+                    <a:p>
+                      <a:pPr algn="ctr"/>
+                      <a:r>
+                        <a:rPr lang="en-CH" dirty="0"/>
+                        <a:t>Ramazani</a:t>
+                      </a:r>
+                    </a:p>
+                  </a:txBody>
+                  <a:tcPr anchor="ctr"/>
+                </a:tc>
+                <a:tc>
+                  <a:txBody>
+                    <a:bodyPr/>
+                    <a:lstStyle/>
+                    <a:p>
+                      <a:pPr algn="ctr"/>
+                      <a:r>
+                        <a:rPr lang="en-CH" dirty="0"/>
+                        <a:t>Myrna</a:t>
+                      </a:r>
+                    </a:p>
+                  </a:txBody>
+                  <a:tcPr anchor="ctr"/>
+                </a:tc>
+                <a:tc>
+                  <a:txBody>
+                    <a:bodyPr/>
+                    <a:lstStyle/>
+                    <a:p>
+                      <a:pPr algn="ctr"/>
+                      <a:r>
+                        <a:rPr lang="en-CH" dirty="0"/>
+                        <a:t>Ismael</a:t>
+                      </a:r>
+                    </a:p>
+                  </a:txBody>
+                  <a:tcPr anchor="ctr"/>
+                </a:tc>
+                <a:tc>
+                  <a:txBody>
+                    <a:bodyPr/>
+                    <a:lstStyle/>
+                    <a:p>
+                      <a:pPr algn="ctr"/>
+                      <a:r>
+                        <a:rPr lang="en-CH" dirty="0"/>
+                        <a:t>Immaculate</a:t>
+                      </a:r>
+                    </a:p>
+                  </a:txBody>
+                  <a:tcPr anchor="ctr"/>
+                </a:tc>
+                <a:tc>
+                  <a:txBody>
+                    <a:bodyPr/>
+                    <a:lstStyle/>
+                    <a:p>
+                      <a:pPr algn="ctr"/>
+                      <a:r>
+                        <a:rPr lang="en-CH" dirty="0"/>
+                        <a:t>Abiye</a:t>
+                      </a:r>
+                    </a:p>
+                  </a:txBody>
+                  <a:tcPr anchor="ctr"/>
+                </a:tc>
+                <a:tc>
+                  <a:txBody>
+                    <a:bodyPr/>
+                    <a:lstStyle/>
+                    <a:p>
+                      <a:pPr algn="ctr"/>
+                      <a:r>
+                        <a:rPr lang="en-CH" dirty="0"/>
+                        <a:t>Otto</a:t>
+                      </a:r>
+                    </a:p>
+                  </a:txBody>
+                  <a:tcPr anchor="ctr"/>
+                </a:tc>
+                <a:tc>
+                  <a:txBody>
+                    <a:bodyPr/>
+                    <a:lstStyle/>
+                    <a:p>
+                      <a:pPr algn="ctr"/>
+                      <a:r>
+                        <a:rPr lang="en-CH" dirty="0"/>
+                        <a:t>Ali</a:t>
+                      </a:r>
+                    </a:p>
+                  </a:txBody>
+                  <a:tcPr anchor="ctr"/>
+                </a:tc>
+                <a:tc>
+                  <a:txBody>
+                    <a:bodyPr/>
+                    <a:lstStyle/>
+                    <a:p>
+                      <a:pPr algn="ctr"/>
+                      <a:r>
+                        <a:rPr lang="en-CH" dirty="0"/>
+                        <a:t>Uthman</a:t>
+                      </a:r>
+                    </a:p>
+                  </a:txBody>
+                  <a:tcPr anchor="ctr"/>
+                </a:tc>
+                <a:tc>
+                  <a:txBody>
+                    <a:bodyPr/>
+                    <a:lstStyle/>
+                    <a:p>
+                      <a:pPr algn="ctr"/>
+                      <a:r>
+                        <a:rPr lang="en-CH" dirty="0"/>
+                        <a:t>Ester</a:t>
+                      </a:r>
+                    </a:p>
+                  </a:txBody>
+                  <a:tcPr anchor="ctr"/>
+                </a:tc>
+                <a:tc>
+                  <a:txBody>
+                    <a:bodyPr/>
+                    <a:lstStyle/>
+                    <a:p>
+                      <a:pPr algn="ctr"/>
+                      <a:r>
+                        <a:rPr lang="en-CH" dirty="0"/>
+                        <a:t>Wakithi</a:t>
+                      </a:r>
+                    </a:p>
+                  </a:txBody>
+                  <a:tcPr anchor="ctr"/>
+                </a:tc>
+                <a:extLst>
+                  <a:ext uri="{0D108BD9-81ED-4DB2-BD59-A6C34878D82A}">
+                    <a16:rowId xmlns:a16="http://schemas.microsoft.com/office/drawing/2014/main" val="1181408900"/>
+                  </a:ext>
+                </a:extLst>
+              </a:tr>
+            </a:tbl>
+          </a:graphicData>
+        </a:graphic>
+      </p:graphicFrame>
+      <p:sp>
+        <p:nvSpPr>
+          <p:cNvPr id="6" name="TextBox 5">
+            <a:extLst>
+              <a:ext uri="{FF2B5EF4-FFF2-40B4-BE49-F238E27FC236}">
+                <a16:creationId xmlns:a16="http://schemas.microsoft.com/office/drawing/2014/main" id="{9F9D60F0-884E-EB4F-99CE-7DDCFDFB78A3}"/>
+              </a:ext>
+            </a:extLst>
+          </p:cNvPr>
+          <p:cNvSpPr txBox="1"/>
+          <p:nvPr/>
+        </p:nvSpPr>
+        <p:spPr>
+          <a:xfrm>
+            <a:off x="394613" y="1135672"/>
+            <a:ext cx="1658474" cy="707886"/>
+          </a:xfrm>
+          <a:prstGeom prst="rect">
+            <a:avLst/>
+          </a:prstGeom>
+          <a:noFill/>
+        </p:spPr>
+        <p:txBody>
+          <a:bodyPr wrap="square" rtlCol="0">
+            <a:spAutoFit/>
+          </a:bodyPr>
+          <a:lstStyle/>
+          <a:p>
+            <a:pPr lvl="1"/>
+            <a:r>
+              <a:rPr lang="en-CH" sz="2000" dirty="0">
+                <a:latin typeface="Calibri" panose="020F0502020204030204" pitchFamily="34" charset="0"/>
+                <a:cs typeface="Calibri" panose="020F0502020204030204" pitchFamily="34" charset="0"/>
+              </a:rPr>
+              <a:t>Pair 1</a:t>
+            </a:r>
+          </a:p>
+          <a:p>
+            <a:pPr marL="457189" indent="-457189">
+              <a:buFont typeface="Arial" panose="020B0604020202020204" pitchFamily="34" charset="0"/>
+              <a:buChar char="•"/>
+            </a:pPr>
+            <a:endParaRPr lang="en-CH" sz="2000" dirty="0">
+              <a:latin typeface="Calibri" panose="020F0502020204030204" pitchFamily="34" charset="0"/>
+              <a:cs typeface="Calibri" panose="020F0502020204030204" pitchFamily="34" charset="0"/>
+            </a:endParaRPr>
+          </a:p>
+        </p:txBody>
+      </p:sp>
+      <p:sp>
+        <p:nvSpPr>
+          <p:cNvPr id="7" name="TextBox 6">
+            <a:extLst>
+              <a:ext uri="{FF2B5EF4-FFF2-40B4-BE49-F238E27FC236}">
+                <a16:creationId xmlns:a16="http://schemas.microsoft.com/office/drawing/2014/main" id="{065813D8-E6B8-8C42-A1F8-1131881DB51D}"/>
+              </a:ext>
+            </a:extLst>
+          </p:cNvPr>
+          <p:cNvSpPr txBox="1"/>
+          <p:nvPr/>
+        </p:nvSpPr>
+        <p:spPr>
+          <a:xfrm>
+            <a:off x="1461414" y="1105099"/>
+            <a:ext cx="1658474" cy="707886"/>
+          </a:xfrm>
+          <a:prstGeom prst="rect">
+            <a:avLst/>
+          </a:prstGeom>
+          <a:noFill/>
+        </p:spPr>
+        <p:txBody>
+          <a:bodyPr wrap="square" rtlCol="0">
+            <a:spAutoFit/>
+          </a:bodyPr>
+          <a:lstStyle/>
+          <a:p>
+            <a:pPr lvl="1"/>
+            <a:r>
+              <a:rPr lang="en-CH" sz="2000" dirty="0">
+                <a:latin typeface="Calibri" panose="020F0502020204030204" pitchFamily="34" charset="0"/>
+                <a:cs typeface="Calibri" panose="020F0502020204030204" pitchFamily="34" charset="0"/>
+              </a:rPr>
+              <a:t>Pair 2</a:t>
+            </a:r>
+          </a:p>
+          <a:p>
+            <a:pPr marL="457189" indent="-457189">
+              <a:buFont typeface="Arial" panose="020B0604020202020204" pitchFamily="34" charset="0"/>
+              <a:buChar char="•"/>
+            </a:pPr>
+            <a:endParaRPr lang="en-CH" sz="2000" dirty="0">
+              <a:latin typeface="Calibri" panose="020F0502020204030204" pitchFamily="34" charset="0"/>
+              <a:cs typeface="Calibri" panose="020F0502020204030204" pitchFamily="34" charset="0"/>
+            </a:endParaRPr>
+          </a:p>
+        </p:txBody>
+      </p:sp>
+      <p:sp>
+        <p:nvSpPr>
+          <p:cNvPr id="8" name="TextBox 7">
+            <a:extLst>
+              <a:ext uri="{FF2B5EF4-FFF2-40B4-BE49-F238E27FC236}">
+                <a16:creationId xmlns:a16="http://schemas.microsoft.com/office/drawing/2014/main" id="{A3B0221F-6EE4-574C-B536-2352B3CD0BF9}"/>
+              </a:ext>
+            </a:extLst>
+          </p:cNvPr>
+          <p:cNvSpPr txBox="1"/>
+          <p:nvPr/>
+        </p:nvSpPr>
+        <p:spPr>
+          <a:xfrm>
+            <a:off x="2508481" y="1095967"/>
+            <a:ext cx="1658474" cy="707886"/>
+          </a:xfrm>
+          <a:prstGeom prst="rect">
+            <a:avLst/>
+          </a:prstGeom>
+          <a:noFill/>
+        </p:spPr>
+        <p:txBody>
+          <a:bodyPr wrap="square" rtlCol="0">
+            <a:spAutoFit/>
+          </a:bodyPr>
+          <a:lstStyle/>
+          <a:p>
+            <a:pPr lvl="1"/>
+            <a:r>
+              <a:rPr lang="en-CH" sz="2000" dirty="0">
+                <a:latin typeface="Calibri" panose="020F0502020204030204" pitchFamily="34" charset="0"/>
+                <a:cs typeface="Calibri" panose="020F0502020204030204" pitchFamily="34" charset="0"/>
+              </a:rPr>
+              <a:t>Pair 3</a:t>
+            </a:r>
+          </a:p>
+          <a:p>
+            <a:pPr marL="457189" indent="-457189">
+              <a:buFont typeface="Arial" panose="020B0604020202020204" pitchFamily="34" charset="0"/>
+              <a:buChar char="•"/>
+            </a:pPr>
+            <a:endParaRPr lang="en-CH" sz="2000" dirty="0">
+              <a:latin typeface="Calibri" panose="020F0502020204030204" pitchFamily="34" charset="0"/>
+              <a:cs typeface="Calibri" panose="020F0502020204030204" pitchFamily="34" charset="0"/>
+            </a:endParaRPr>
+          </a:p>
+        </p:txBody>
+      </p:sp>
+      <p:sp>
+        <p:nvSpPr>
+          <p:cNvPr id="9" name="TextBox 8">
+            <a:extLst>
+              <a:ext uri="{FF2B5EF4-FFF2-40B4-BE49-F238E27FC236}">
+                <a16:creationId xmlns:a16="http://schemas.microsoft.com/office/drawing/2014/main" id="{F662D655-584A-844C-87DA-6C3872E2374E}"/>
+              </a:ext>
+            </a:extLst>
+          </p:cNvPr>
+          <p:cNvSpPr txBox="1"/>
+          <p:nvPr/>
+        </p:nvSpPr>
+        <p:spPr>
+          <a:xfrm>
+            <a:off x="3638564" y="1083088"/>
+            <a:ext cx="1658474" cy="707886"/>
+          </a:xfrm>
+          <a:prstGeom prst="rect">
+            <a:avLst/>
+          </a:prstGeom>
+          <a:noFill/>
+        </p:spPr>
+        <p:txBody>
+          <a:bodyPr wrap="square" rtlCol="0">
+            <a:spAutoFit/>
+          </a:bodyPr>
+          <a:lstStyle/>
+          <a:p>
+            <a:pPr lvl="1"/>
+            <a:r>
+              <a:rPr lang="en-CH" sz="2000" dirty="0">
+                <a:latin typeface="Calibri" panose="020F0502020204030204" pitchFamily="34" charset="0"/>
+                <a:cs typeface="Calibri" panose="020F0502020204030204" pitchFamily="34" charset="0"/>
+              </a:rPr>
+              <a:t>Pair 4</a:t>
+            </a:r>
+          </a:p>
+          <a:p>
+            <a:pPr marL="457189" indent="-457189">
+              <a:buFont typeface="Arial" panose="020B0604020202020204" pitchFamily="34" charset="0"/>
+              <a:buChar char="•"/>
+            </a:pPr>
+            <a:endParaRPr lang="en-CH" sz="2000" dirty="0">
+              <a:latin typeface="Calibri" panose="020F0502020204030204" pitchFamily="34" charset="0"/>
+              <a:cs typeface="Calibri" panose="020F0502020204030204" pitchFamily="34" charset="0"/>
+            </a:endParaRPr>
+          </a:p>
+        </p:txBody>
+      </p:sp>
+      <p:sp>
+        <p:nvSpPr>
+          <p:cNvPr id="10" name="TextBox 9">
+            <a:extLst>
+              <a:ext uri="{FF2B5EF4-FFF2-40B4-BE49-F238E27FC236}">
+                <a16:creationId xmlns:a16="http://schemas.microsoft.com/office/drawing/2014/main" id="{647B66BB-E5A2-5C4D-82D2-A1DF4C23D2E3}"/>
+              </a:ext>
+            </a:extLst>
+          </p:cNvPr>
+          <p:cNvSpPr txBox="1"/>
+          <p:nvPr/>
+        </p:nvSpPr>
+        <p:spPr>
+          <a:xfrm>
+            <a:off x="4744500" y="1086682"/>
+            <a:ext cx="1658474" cy="707886"/>
+          </a:xfrm>
+          <a:prstGeom prst="rect">
+            <a:avLst/>
+          </a:prstGeom>
+          <a:noFill/>
+        </p:spPr>
+        <p:txBody>
+          <a:bodyPr wrap="square" rtlCol="0">
+            <a:spAutoFit/>
+          </a:bodyPr>
+          <a:lstStyle/>
+          <a:p>
+            <a:pPr lvl="1"/>
+            <a:r>
+              <a:rPr lang="en-CH" sz="2000" dirty="0">
+                <a:latin typeface="Calibri" panose="020F0502020204030204" pitchFamily="34" charset="0"/>
+                <a:cs typeface="Calibri" panose="020F0502020204030204" pitchFamily="34" charset="0"/>
+              </a:rPr>
+              <a:t>Pair 5</a:t>
+            </a:r>
+          </a:p>
+          <a:p>
+            <a:pPr marL="457189" indent="-457189">
+              <a:buFont typeface="Arial" panose="020B0604020202020204" pitchFamily="34" charset="0"/>
+              <a:buChar char="•"/>
+            </a:pPr>
+            <a:endParaRPr lang="en-CH" sz="2000" dirty="0">
+              <a:latin typeface="Calibri" panose="020F0502020204030204" pitchFamily="34" charset="0"/>
+              <a:cs typeface="Calibri" panose="020F0502020204030204" pitchFamily="34" charset="0"/>
+            </a:endParaRPr>
+          </a:p>
+        </p:txBody>
+      </p:sp>
+      <p:sp>
+        <p:nvSpPr>
+          <p:cNvPr id="11" name="TextBox 10">
+            <a:extLst>
+              <a:ext uri="{FF2B5EF4-FFF2-40B4-BE49-F238E27FC236}">
+                <a16:creationId xmlns:a16="http://schemas.microsoft.com/office/drawing/2014/main" id="{C0381C11-566D-7346-A40D-5F1652543878}"/>
+              </a:ext>
+            </a:extLst>
+          </p:cNvPr>
+          <p:cNvSpPr txBox="1"/>
+          <p:nvPr/>
+        </p:nvSpPr>
+        <p:spPr>
+          <a:xfrm>
+            <a:off x="5731788" y="1048045"/>
+            <a:ext cx="1658474" cy="707886"/>
+          </a:xfrm>
+          <a:prstGeom prst="rect">
+            <a:avLst/>
+          </a:prstGeom>
+          <a:noFill/>
+        </p:spPr>
+        <p:txBody>
+          <a:bodyPr wrap="square" rtlCol="0">
+            <a:spAutoFit/>
+          </a:bodyPr>
+          <a:lstStyle/>
+          <a:p>
+            <a:pPr lvl="1"/>
+            <a:r>
+              <a:rPr lang="en-CH" sz="2000" dirty="0">
+                <a:latin typeface="Calibri" panose="020F0502020204030204" pitchFamily="34" charset="0"/>
+                <a:cs typeface="Calibri" panose="020F0502020204030204" pitchFamily="34" charset="0"/>
+              </a:rPr>
+              <a:t>Pair 6</a:t>
+            </a:r>
+          </a:p>
+          <a:p>
+            <a:pPr marL="457189" indent="-457189">
+              <a:buFont typeface="Arial" panose="020B0604020202020204" pitchFamily="34" charset="0"/>
+              <a:buChar char="•"/>
+            </a:pPr>
+            <a:endParaRPr lang="en-CH" sz="2000" dirty="0">
+              <a:latin typeface="Calibri" panose="020F0502020204030204" pitchFamily="34" charset="0"/>
+              <a:cs typeface="Calibri" panose="020F0502020204030204" pitchFamily="34" charset="0"/>
+            </a:endParaRPr>
+          </a:p>
+        </p:txBody>
+      </p:sp>
+      <p:sp>
+        <p:nvSpPr>
+          <p:cNvPr id="12" name="TextBox 11">
+            <a:extLst>
+              <a:ext uri="{FF2B5EF4-FFF2-40B4-BE49-F238E27FC236}">
+                <a16:creationId xmlns:a16="http://schemas.microsoft.com/office/drawing/2014/main" id="{C06F3C80-C802-2B48-86D3-D9ECE440C3AA}"/>
+              </a:ext>
+            </a:extLst>
+          </p:cNvPr>
+          <p:cNvSpPr txBox="1"/>
+          <p:nvPr/>
+        </p:nvSpPr>
+        <p:spPr>
+          <a:xfrm>
+            <a:off x="6765240" y="1046977"/>
+            <a:ext cx="1658474" cy="707886"/>
+          </a:xfrm>
+          <a:prstGeom prst="rect">
+            <a:avLst/>
+          </a:prstGeom>
+          <a:noFill/>
+        </p:spPr>
+        <p:txBody>
+          <a:bodyPr wrap="square" rtlCol="0">
+            <a:spAutoFit/>
+          </a:bodyPr>
+          <a:lstStyle/>
+          <a:p>
+            <a:pPr lvl="1"/>
+            <a:r>
+              <a:rPr lang="en-CH" sz="2000" dirty="0">
+                <a:latin typeface="Calibri" panose="020F0502020204030204" pitchFamily="34" charset="0"/>
+                <a:cs typeface="Calibri" panose="020F0502020204030204" pitchFamily="34" charset="0"/>
+              </a:rPr>
+              <a:t>Pair 7</a:t>
+            </a:r>
+          </a:p>
+          <a:p>
+            <a:pPr marL="457189" indent="-457189">
+              <a:buFont typeface="Arial" panose="020B0604020202020204" pitchFamily="34" charset="0"/>
+              <a:buChar char="•"/>
+            </a:pPr>
+            <a:endParaRPr lang="en-CH" sz="2000" dirty="0">
+              <a:latin typeface="Calibri" panose="020F0502020204030204" pitchFamily="34" charset="0"/>
+              <a:cs typeface="Calibri" panose="020F0502020204030204" pitchFamily="34" charset="0"/>
+            </a:endParaRPr>
+          </a:p>
+        </p:txBody>
+      </p:sp>
+      <p:sp>
+        <p:nvSpPr>
+          <p:cNvPr id="13" name="TextBox 12">
+            <a:extLst>
+              <a:ext uri="{FF2B5EF4-FFF2-40B4-BE49-F238E27FC236}">
+                <a16:creationId xmlns:a16="http://schemas.microsoft.com/office/drawing/2014/main" id="{315F76EF-11CA-A549-924A-3FB2B9B30236}"/>
+              </a:ext>
+            </a:extLst>
+          </p:cNvPr>
+          <p:cNvSpPr txBox="1"/>
+          <p:nvPr/>
+        </p:nvSpPr>
+        <p:spPr>
+          <a:xfrm>
+            <a:off x="7944917" y="1046977"/>
+            <a:ext cx="1658474" cy="707886"/>
+          </a:xfrm>
+          <a:prstGeom prst="rect">
+            <a:avLst/>
+          </a:prstGeom>
+          <a:noFill/>
+        </p:spPr>
+        <p:txBody>
+          <a:bodyPr wrap="square" rtlCol="0">
+            <a:spAutoFit/>
+          </a:bodyPr>
+          <a:lstStyle/>
+          <a:p>
+            <a:pPr lvl="1"/>
+            <a:r>
+              <a:rPr lang="en-CH" sz="2000" dirty="0">
+                <a:latin typeface="Calibri" panose="020F0502020204030204" pitchFamily="34" charset="0"/>
+                <a:cs typeface="Calibri" panose="020F0502020204030204" pitchFamily="34" charset="0"/>
+              </a:rPr>
+              <a:t>Pair 8</a:t>
+            </a:r>
+          </a:p>
+          <a:p>
+            <a:pPr marL="457189" indent="-457189">
+              <a:buFont typeface="Arial" panose="020B0604020202020204" pitchFamily="34" charset="0"/>
+              <a:buChar char="•"/>
+            </a:pPr>
+            <a:endParaRPr lang="en-CH" sz="2000" dirty="0">
+              <a:latin typeface="Calibri" panose="020F0502020204030204" pitchFamily="34" charset="0"/>
+              <a:cs typeface="Calibri" panose="020F0502020204030204" pitchFamily="34" charset="0"/>
+            </a:endParaRPr>
+          </a:p>
+        </p:txBody>
+      </p:sp>
+      <p:sp>
+        <p:nvSpPr>
+          <p:cNvPr id="14" name="TextBox 13">
+            <a:extLst>
+              <a:ext uri="{FF2B5EF4-FFF2-40B4-BE49-F238E27FC236}">
+                <a16:creationId xmlns:a16="http://schemas.microsoft.com/office/drawing/2014/main" id="{881423C5-E6A6-EF48-9EF2-5605C3C6F57D}"/>
+              </a:ext>
+            </a:extLst>
+          </p:cNvPr>
+          <p:cNvSpPr txBox="1"/>
+          <p:nvPr/>
+        </p:nvSpPr>
+        <p:spPr>
+          <a:xfrm>
+            <a:off x="8947163" y="1086682"/>
+            <a:ext cx="1658474" cy="707886"/>
+          </a:xfrm>
+          <a:prstGeom prst="rect">
+            <a:avLst/>
+          </a:prstGeom>
+          <a:noFill/>
+        </p:spPr>
+        <p:txBody>
+          <a:bodyPr wrap="square" rtlCol="0">
+            <a:spAutoFit/>
+          </a:bodyPr>
+          <a:lstStyle/>
+          <a:p>
+            <a:pPr lvl="1"/>
+            <a:r>
+              <a:rPr lang="en-CH" sz="2000" dirty="0">
+                <a:latin typeface="Calibri" panose="020F0502020204030204" pitchFamily="34" charset="0"/>
+                <a:cs typeface="Calibri" panose="020F0502020204030204" pitchFamily="34" charset="0"/>
+              </a:rPr>
+              <a:t>Pair 9</a:t>
+            </a:r>
+          </a:p>
+          <a:p>
+            <a:pPr marL="457189" indent="-457189">
+              <a:buFont typeface="Arial" panose="020B0604020202020204" pitchFamily="34" charset="0"/>
+              <a:buChar char="•"/>
+            </a:pPr>
+            <a:endParaRPr lang="en-CH" sz="2000" dirty="0">
+              <a:latin typeface="Calibri" panose="020F0502020204030204" pitchFamily="34" charset="0"/>
+              <a:cs typeface="Calibri" panose="020F0502020204030204" pitchFamily="34" charset="0"/>
+            </a:endParaRPr>
+          </a:p>
+        </p:txBody>
+      </p:sp>
+      <p:sp>
+        <p:nvSpPr>
+          <p:cNvPr id="16" name="TextBox 15">
+            <a:extLst>
+              <a:ext uri="{FF2B5EF4-FFF2-40B4-BE49-F238E27FC236}">
+                <a16:creationId xmlns:a16="http://schemas.microsoft.com/office/drawing/2014/main" id="{F35268B6-4B5D-5449-8C43-A308DD1C63FD}"/>
+              </a:ext>
+            </a:extLst>
+          </p:cNvPr>
+          <p:cNvSpPr txBox="1"/>
+          <p:nvPr/>
+        </p:nvSpPr>
+        <p:spPr>
+          <a:xfrm>
+            <a:off x="9864956" y="1087172"/>
+            <a:ext cx="1658474" cy="707886"/>
+          </a:xfrm>
+          <a:prstGeom prst="rect">
+            <a:avLst/>
+          </a:prstGeom>
+          <a:noFill/>
+        </p:spPr>
+        <p:txBody>
+          <a:bodyPr wrap="square" rtlCol="0">
+            <a:spAutoFit/>
+          </a:bodyPr>
+          <a:lstStyle/>
+          <a:p>
+            <a:pPr lvl="1"/>
+            <a:r>
+              <a:rPr lang="en-CH" sz="2000" dirty="0">
+                <a:latin typeface="Calibri" panose="020F0502020204030204" pitchFamily="34" charset="0"/>
+                <a:cs typeface="Calibri" panose="020F0502020204030204" pitchFamily="34" charset="0"/>
+              </a:rPr>
+              <a:t>Pair 10</a:t>
+            </a:r>
+          </a:p>
+          <a:p>
+            <a:pPr marL="457189" indent="-457189">
+              <a:buFont typeface="Arial" panose="020B0604020202020204" pitchFamily="34" charset="0"/>
+              <a:buChar char="•"/>
+            </a:pPr>
+            <a:endParaRPr lang="en-CH" sz="2000" dirty="0">
+              <a:latin typeface="Calibri" panose="020F0502020204030204" pitchFamily="34" charset="0"/>
+              <a:cs typeface="Calibri" panose="020F0502020204030204" pitchFamily="34" charset="0"/>
+            </a:endParaRPr>
+          </a:p>
+        </p:txBody>
+      </p:sp>
+    </p:spTree>
+    <p:extLst>
+      <p:ext uri="{BB962C8B-B14F-4D97-AF65-F5344CB8AC3E}">
+        <p14:creationId xmlns:p14="http://schemas.microsoft.com/office/powerpoint/2010/main" val="3413830005"/>
+      </p:ext>
+    </p:extLst>
+  </p:cSld>
+  <p:clrMapOvr>
+    <a:masterClrMapping/>
+  </p:clrMapOvr>
+</p:sld>
+</file>
+
+<file path=ppt/slides/slide7.xml><?xml version="1.0" encoding="utf-8"?>
+<p:sld xmlns:a="http://schemas.openxmlformats.org/drawingml/2006/main" xmlns:r="http://schemas.openxmlformats.org/officeDocument/2006/relationships" xmlns:p="http://schemas.openxmlformats.org/presentationml/2006/main">
+  <p:cSld>
+    <p:spTree>
+      <p:nvGrpSpPr>
+        <p:cNvPr id="1" name=""/>
+        <p:cNvGrpSpPr/>
+        <p:nvPr/>
+      </p:nvGrpSpPr>
+      <p:grpSpPr>
+        <a:xfrm>
+          <a:off x="0" y="0"/>
+          <a:ext cx="0" cy="0"/>
+          <a:chOff x="0" y="0"/>
+          <a:chExt cx="0" cy="0"/>
+        </a:xfrm>
+      </p:grpSpPr>
+      <p:cxnSp>
+        <p:nvCxnSpPr>
+          <p:cNvPr id="43" name="Straight Connector 42">
+            <a:extLst>
+              <a:ext uri="{FF2B5EF4-FFF2-40B4-BE49-F238E27FC236}">
+                <a16:creationId xmlns:a16="http://schemas.microsoft.com/office/drawing/2014/main" id="{3A5077C6-7E4F-2F4E-BD92-B687C1BB85ED}"/>
+              </a:ext>
+            </a:extLst>
+          </p:cNvPr>
+          <p:cNvCxnSpPr>
+            <a:cxnSpLocks/>
+          </p:cNvCxnSpPr>
+          <p:nvPr/>
+        </p:nvCxnSpPr>
+        <p:spPr>
+          <a:xfrm>
+            <a:off x="479419" y="647537"/>
+            <a:ext cx="744431" cy="0"/>
+          </a:xfrm>
+          <a:prstGeom prst="line">
+            <a:avLst/>
+          </a:prstGeom>
+          <a:ln w="38100">
+            <a:solidFill>
+              <a:srgbClr val="57A7B1"/>
+            </a:solidFill>
+          </a:ln>
+        </p:spPr>
+        <p:style>
+          <a:lnRef idx="1">
+            <a:schemeClr val="accent1"/>
+          </a:lnRef>
+          <a:fillRef idx="0">
+            <a:schemeClr val="accent1"/>
+          </a:fillRef>
+          <a:effectRef idx="0">
+            <a:schemeClr val="accent1"/>
+          </a:effectRef>
+          <a:fontRef idx="minor">
+            <a:schemeClr val="tx1"/>
+          </a:fontRef>
+        </p:style>
+      </p:cxnSp>
+      <p:sp>
+        <p:nvSpPr>
+          <p:cNvPr id="44" name="TextBox 43">
+            <a:extLst>
+              <a:ext uri="{FF2B5EF4-FFF2-40B4-BE49-F238E27FC236}">
+                <a16:creationId xmlns:a16="http://schemas.microsoft.com/office/drawing/2014/main" id="{BFA7D6A8-F365-734B-A552-638838DBD786}"/>
+              </a:ext>
+            </a:extLst>
+          </p:cNvPr>
+          <p:cNvSpPr txBox="1"/>
+          <p:nvPr/>
+        </p:nvSpPr>
+        <p:spPr>
+          <a:xfrm>
+            <a:off x="355478" y="128981"/>
             <a:ext cx="3781741" cy="523220"/>
           </a:xfrm>
           <a:prstGeom prst="rect">
@@ -37010,217 +38065,6 @@
       <p:bldP spid="4" grpId="0" uiExpand="1" build="p"/>
     </p:bldLst>
   </p:timing>
-</p:sld>
-</file>
-
-<file path=ppt/slides/slide7.xml><?xml version="1.0" encoding="utf-8"?>
-<p:sld xmlns:a="http://schemas.openxmlformats.org/drawingml/2006/main" xmlns:r="http://schemas.openxmlformats.org/officeDocument/2006/relationships" xmlns:p="http://schemas.openxmlformats.org/presentationml/2006/main">
-  <p:cSld>
-    <p:spTree>
-      <p:nvGrpSpPr>
-        <p:cNvPr id="1" name="Shape 48"/>
-        <p:cNvGrpSpPr/>
-        <p:nvPr/>
-      </p:nvGrpSpPr>
-      <p:grpSpPr>
-        <a:xfrm>
-          <a:off x="0" y="0"/>
-          <a:ext cx="0" cy="0"/>
-          <a:chOff x="0" y="0"/>
-          <a:chExt cx="0" cy="0"/>
-        </a:xfrm>
-      </p:grpSpPr>
-      <p:sp>
-        <p:nvSpPr>
-          <p:cNvPr id="49" name="Google Shape;49;p9"/>
-          <p:cNvSpPr txBox="1">
-            <a:spLocks noGrp="1"/>
-          </p:cNvSpPr>
-          <p:nvPr>
-            <p:ph type="body" idx="1"/>
-          </p:nvPr>
-        </p:nvSpPr>
-        <p:spPr>
-          <a:xfrm>
-            <a:off x="317119" y="791763"/>
-            <a:ext cx="11650763" cy="3259826"/>
-          </a:xfrm>
-          <a:prstGeom prst="rect">
-            <a:avLst/>
-          </a:prstGeom>
-        </p:spPr>
-        <p:txBody>
-          <a:bodyPr spcFirstLastPara="1" wrap="square" lIns="91433" tIns="45700" rIns="91433" bIns="45700" anchor="t" anchorCtr="0">
-            <a:spAutoFit/>
-          </a:bodyPr>
-          <a:lstStyle/>
-          <a:p>
-            <a:pPr marL="0" indent="0">
-              <a:lnSpc>
-                <a:spcPct val="100000"/>
-              </a:lnSpc>
-              <a:buNone/>
-              <a:defRPr/>
-            </a:pPr>
-            <a:r>
-              <a:rPr lang="en" sz="3200" dirty="0">
-                <a:solidFill>
-                  <a:schemeClr val="tx1"/>
-                </a:solidFill>
-              </a:rPr>
-              <a:t>1</a:t>
-            </a:r>
-            <a:r>
-              <a:rPr lang="en" sz="3200" kern="0" dirty="0">
-                <a:solidFill>
-                  <a:schemeClr val="tx1"/>
-                </a:solidFill>
-              </a:rPr>
-              <a:t>. 👋🏽 Welcome quiz (10 minutes) </a:t>
-            </a:r>
-          </a:p>
-          <a:p>
-            <a:pPr marL="0" indent="0">
-              <a:lnSpc>
-                <a:spcPct val="100000"/>
-              </a:lnSpc>
-              <a:buNone/>
-              <a:defRPr/>
-            </a:pPr>
-            <a:r>
-              <a:rPr lang="en" sz="3200" dirty="0">
-                <a:solidFill>
-                  <a:schemeClr val="tx1"/>
-                </a:solidFill>
-              </a:rPr>
-              <a:t>2. 📣 Announcements (10 minutes)</a:t>
-            </a:r>
-          </a:p>
-          <a:p>
-            <a:pPr marL="0" indent="0">
-              <a:lnSpc>
-                <a:spcPct val="100000"/>
-              </a:lnSpc>
-              <a:buNone/>
-              <a:defRPr/>
-            </a:pPr>
-            <a:r>
-              <a:rPr lang="en" sz="3200" dirty="0">
-                <a:solidFill>
-                  <a:schemeClr val="tx1"/>
-                </a:solidFill>
-              </a:rPr>
-              <a:t>3. </a:t>
-            </a:r>
-            <a:r>
-              <a:rPr lang="en" sz="3200" kern="0" dirty="0">
-                <a:solidFill>
-                  <a:schemeClr val="tx1"/>
-                </a:solidFill>
-              </a:rPr>
-              <a:t>👩🏽‍💻</a:t>
-            </a:r>
-            <a:r>
-              <a:rPr lang="en" sz="3200" dirty="0">
-                <a:solidFill>
-                  <a:schemeClr val="tx1"/>
-                </a:solidFill>
-              </a:rPr>
-              <a:t> Pair </a:t>
-            </a:r>
-            <a:r>
-              <a:rPr lang="en" sz="3200" kern="0" dirty="0">
-                <a:solidFill>
-                  <a:schemeClr val="tx1"/>
-                </a:solidFill>
-              </a:rPr>
-              <a:t>exercise (60 minutes)</a:t>
-            </a:r>
-          </a:p>
-          <a:p>
-            <a:pPr marL="0" indent="0">
-              <a:lnSpc>
-                <a:spcPct val="100000"/>
-              </a:lnSpc>
-              <a:buNone/>
-              <a:defRPr/>
-            </a:pPr>
-            <a:r>
-              <a:rPr lang="en" sz="3200" kern="0" dirty="0">
-                <a:solidFill>
-                  <a:schemeClr val="tx1"/>
-                </a:solidFill>
-              </a:rPr>
-              <a:t>4. 🥤Optional tea/bathroom/games break (10 minutes)</a:t>
-            </a:r>
-          </a:p>
-          <a:p>
-            <a:pPr marL="0" indent="0">
-              <a:lnSpc>
-                <a:spcPct val="100000"/>
-              </a:lnSpc>
-              <a:buNone/>
-              <a:defRPr/>
-            </a:pPr>
-            <a:r>
-              <a:rPr lang="en" sz="3200" dirty="0">
-                <a:solidFill>
-                  <a:schemeClr val="tx1"/>
-                </a:solidFill>
-              </a:rPr>
-              <a:t>5. 📽 Presentations (40 minutes)</a:t>
-            </a:r>
-            <a:endParaRPr lang="en" sz="3200" kern="0" dirty="0">
-              <a:solidFill>
-                <a:schemeClr val="tx1"/>
-              </a:solidFill>
-            </a:endParaRPr>
-          </a:p>
-        </p:txBody>
-      </p:sp>
-      <p:sp>
-        <p:nvSpPr>
-          <p:cNvPr id="50" name="Google Shape;50;p9"/>
-          <p:cNvSpPr txBox="1">
-            <a:spLocks noGrp="1"/>
-          </p:cNvSpPr>
-          <p:nvPr>
-            <p:ph type="title"/>
-          </p:nvPr>
-        </p:nvSpPr>
-        <p:spPr>
-          <a:xfrm>
-            <a:off x="317119" y="256217"/>
-            <a:ext cx="5778800" cy="535491"/>
-          </a:xfrm>
-          <a:prstGeom prst="rect">
-            <a:avLst/>
-          </a:prstGeom>
-        </p:spPr>
-        <p:txBody>
-          <a:bodyPr spcFirstLastPara="1" vert="horz" wrap="square" lIns="91433" tIns="45700" rIns="91433" bIns="45700" rtlCol="0" anchor="ctr" anchorCtr="0">
-            <a:spAutoFit/>
-          </a:bodyPr>
-          <a:lstStyle/>
-          <a:p>
-            <a:r>
-              <a:rPr lang="en" dirty="0"/>
-              <a:t>Workshop outline</a:t>
-            </a:r>
-            <a:endParaRPr dirty="0"/>
-          </a:p>
-        </p:txBody>
-      </p:sp>
-    </p:spTree>
-    <p:extLst>
-      <p:ext uri="{BB962C8B-B14F-4D97-AF65-F5344CB8AC3E}">
-        <p14:creationId xmlns:p14="http://schemas.microsoft.com/office/powerpoint/2010/main" val="2887006889"/>
-      </p:ext>
-    </p:extLst>
-  </p:cSld>
-  <p:clrMapOvr>
-    <a:masterClrMapping/>
-  </p:clrMapOvr>
 </p:sld>
 </file>
 

</xml_diff>